<commit_message>
migliorata ricerca template e sistemata visibilità alcuni valori da pptx
</commit_message>
<xml_diff>
--- a/Templates/NTemplateBasko PDV.pptx
+++ b/Templates/NTemplateBasko PDV.pptx
@@ -5858,7 +5858,7 @@
         </p:nvSpPr>
         <p:spPr bwMode="auto">
           <a:xfrm>
-            <a:off x="4510088" y="5529263"/>
+            <a:off x="4467647" y="5724526"/>
             <a:ext cx="863600" cy="338137"/>
           </a:xfrm>
           <a:prstGeom prst="rect">
@@ -6032,19 +6032,19 @@
               <a:buNone/>
             </a:pPr>
             <a:r>
-              <a:rPr lang="it-IT" altLang="it-IT" sz="1100" b="1">
+              <a:rPr lang="it-IT" altLang="it-IT" sz="1600" b="1" dirty="0">
                 <a:latin typeface="Arial" panose="020B0604020202020204" pitchFamily="34" charset="0"/>
               </a:rPr>
               <a:t>&lt;</a:t>
             </a:r>
             <a:r>
-              <a:rPr lang="it-IT" altLang="it-IT" sz="1600" b="1">
+              <a:rPr lang="it-IT" altLang="it-IT" sz="1600" b="1" dirty="0" err="1">
                 <a:latin typeface="Arial" panose="020B0604020202020204" pitchFamily="34" charset="0"/>
               </a:rPr>
               <a:t>num</a:t>
             </a:r>
             <a:r>
-              <a:rPr lang="it-IT" altLang="it-IT" sz="1100" b="1">
+              <a:rPr lang="it-IT" altLang="it-IT" sz="1600" b="1" dirty="0">
                 <a:latin typeface="Arial" panose="020B0604020202020204" pitchFamily="34" charset="0"/>
               </a:rPr>
               <a:t>&gt;</a:t>
@@ -6068,8 +6068,8 @@
         </p:nvSpPr>
         <p:spPr bwMode="auto">
           <a:xfrm>
-            <a:off x="5564188" y="5529263"/>
-            <a:ext cx="647700" cy="338137"/>
+            <a:off x="5505449" y="5724004"/>
+            <a:ext cx="731837" cy="338554"/>
           </a:xfrm>
           <a:prstGeom prst="rect">
             <a:avLst/>
@@ -6099,7 +6099,7 @@
           </a:extLst>
         </p:spPr>
         <p:txBody>
-          <a:bodyPr>
+          <a:bodyPr wrap="square">
             <a:spAutoFit/>
           </a:bodyPr>
           <a:lstStyle>
@@ -6242,22 +6242,10 @@
               <a:buNone/>
             </a:pPr>
             <a:r>
-              <a:rPr lang="it-IT" altLang="it-IT" sz="1100" b="1">
+              <a:rPr lang="it-IT" altLang="it-IT" sz="1600" b="1" dirty="0">
                 <a:latin typeface="Arial" panose="020B0604020202020204" pitchFamily="34" charset="0"/>
               </a:rPr>
-              <a:t>&lt;</a:t>
-            </a:r>
-            <a:r>
-              <a:rPr lang="it-IT" altLang="it-IT" sz="1600" b="1">
-                <a:latin typeface="Arial" panose="020B0604020202020204" pitchFamily="34" charset="0"/>
-              </a:rPr>
-              <a:t>tot</a:t>
-            </a:r>
-            <a:r>
-              <a:rPr lang="it-IT" altLang="it-IT" sz="1100" b="1">
-                <a:latin typeface="Arial" panose="020B0604020202020204" pitchFamily="34" charset="0"/>
-              </a:rPr>
-              <a:t>&gt;</a:t>
+              <a:t>&lt;tot&gt;</a:t>
             </a:r>
           </a:p>
         </p:txBody>

</xml_diff>